<commit_message>
v3 of the slides
Double ARCHITECTURE SCHEME. Mine can be erased once the new one (yellow one) will be corrected
</commit_message>
<xml_diff>
--- a/SLIDES.pptx
+++ b/SLIDES.pptx
@@ -111,6 +111,11 @@
       </a:defRPr>
     </a:lvl9pPr>
   </p:defaultTextStyle>
+  <p:extLst>
+    <p:ext uri="{EFAFB233-063F-42B5-8137-9DF3F51BA10A}">
+      <p15:sldGuideLst xmlns:p15="http://schemas.microsoft.com/office/powerpoint/2012/main"/>
+    </p:ext>
+  </p:extLst>
 </p:presentation>
 </file>
 
@@ -245,7 +250,7 @@
           <a:p>
             <a:fld id="{B7698D5D-4C6A-4027-B509-65C72FD1763A}" type="datetimeFigureOut">
               <a:rPr lang="en-GB" smtClean="0"/>
-              <a:t>18/05/2016</a:t>
+              <a:t>19/05/2016</a:t>
             </a:fld>
             <a:endParaRPr lang="en-GB"/>
           </a:p>
@@ -415,7 +420,7 @@
           <a:p>
             <a:fld id="{B7698D5D-4C6A-4027-B509-65C72FD1763A}" type="datetimeFigureOut">
               <a:rPr lang="en-GB" smtClean="0"/>
-              <a:t>18/05/2016</a:t>
+              <a:t>19/05/2016</a:t>
             </a:fld>
             <a:endParaRPr lang="en-GB"/>
           </a:p>
@@ -595,7 +600,7 @@
           <a:p>
             <a:fld id="{B7698D5D-4C6A-4027-B509-65C72FD1763A}" type="datetimeFigureOut">
               <a:rPr lang="en-GB" smtClean="0"/>
-              <a:t>18/05/2016</a:t>
+              <a:t>19/05/2016</a:t>
             </a:fld>
             <a:endParaRPr lang="en-GB"/>
           </a:p>
@@ -765,7 +770,7 @@
           <a:p>
             <a:fld id="{B7698D5D-4C6A-4027-B509-65C72FD1763A}" type="datetimeFigureOut">
               <a:rPr lang="en-GB" smtClean="0"/>
-              <a:t>18/05/2016</a:t>
+              <a:t>19/05/2016</a:t>
             </a:fld>
             <a:endParaRPr lang="en-GB"/>
           </a:p>
@@ -1011,7 +1016,7 @@
           <a:p>
             <a:fld id="{B7698D5D-4C6A-4027-B509-65C72FD1763A}" type="datetimeFigureOut">
               <a:rPr lang="en-GB" smtClean="0"/>
-              <a:t>18/05/2016</a:t>
+              <a:t>19/05/2016</a:t>
             </a:fld>
             <a:endParaRPr lang="en-GB"/>
           </a:p>
@@ -1243,7 +1248,7 @@
           <a:p>
             <a:fld id="{B7698D5D-4C6A-4027-B509-65C72FD1763A}" type="datetimeFigureOut">
               <a:rPr lang="en-GB" smtClean="0"/>
-              <a:t>18/05/2016</a:t>
+              <a:t>19/05/2016</a:t>
             </a:fld>
             <a:endParaRPr lang="en-GB"/>
           </a:p>
@@ -1610,7 +1615,7 @@
           <a:p>
             <a:fld id="{B7698D5D-4C6A-4027-B509-65C72FD1763A}" type="datetimeFigureOut">
               <a:rPr lang="en-GB" smtClean="0"/>
-              <a:t>18/05/2016</a:t>
+              <a:t>19/05/2016</a:t>
             </a:fld>
             <a:endParaRPr lang="en-GB"/>
           </a:p>
@@ -1728,7 +1733,7 @@
           <a:p>
             <a:fld id="{B7698D5D-4C6A-4027-B509-65C72FD1763A}" type="datetimeFigureOut">
               <a:rPr lang="en-GB" smtClean="0"/>
-              <a:t>18/05/2016</a:t>
+              <a:t>19/05/2016</a:t>
             </a:fld>
             <a:endParaRPr lang="en-GB"/>
           </a:p>
@@ -1823,7 +1828,7 @@
           <a:p>
             <a:fld id="{B7698D5D-4C6A-4027-B509-65C72FD1763A}" type="datetimeFigureOut">
               <a:rPr lang="en-GB" smtClean="0"/>
-              <a:t>18/05/2016</a:t>
+              <a:t>19/05/2016</a:t>
             </a:fld>
             <a:endParaRPr lang="en-GB"/>
           </a:p>
@@ -2100,7 +2105,7 @@
           <a:p>
             <a:fld id="{B7698D5D-4C6A-4027-B509-65C72FD1763A}" type="datetimeFigureOut">
               <a:rPr lang="en-GB" smtClean="0"/>
-              <a:t>18/05/2016</a:t>
+              <a:t>19/05/2016</a:t>
             </a:fld>
             <a:endParaRPr lang="en-GB"/>
           </a:p>
@@ -2357,7 +2362,7 @@
           <a:p>
             <a:fld id="{B7698D5D-4C6A-4027-B509-65C72FD1763A}" type="datetimeFigureOut">
               <a:rPr lang="en-GB" smtClean="0"/>
-              <a:t>18/05/2016</a:t>
+              <a:t>19/05/2016</a:t>
             </a:fld>
             <a:endParaRPr lang="en-GB"/>
           </a:p>
@@ -2570,7 +2575,7 @@
           <a:p>
             <a:fld id="{B7698D5D-4C6A-4027-B509-65C72FD1763A}" type="datetimeFigureOut">
               <a:rPr lang="en-GB" smtClean="0"/>
-              <a:t>18/05/2016</a:t>
+              <a:t>19/05/2016</a:t>
             </a:fld>
             <a:endParaRPr lang="en-GB"/>
           </a:p>
@@ -3812,7 +3817,7 @@
             </a:r>
             <a:r>
               <a:rPr lang="it-IT" sz="2400" dirty="0" err="1" smtClean="0"/>
-              <a:t>does</a:t>
+              <a:t>will</a:t>
             </a:r>
             <a:r>
               <a:rPr lang="it-IT" sz="2400" dirty="0" smtClean="0"/>
@@ -3827,12 +3832,8 @@
               <a:t> </a:t>
             </a:r>
             <a:r>
-              <a:rPr lang="it-IT" sz="2400" dirty="0" err="1" smtClean="0"/>
-              <a:t>will</a:t>
-            </a:r>
-            <a:r>
-              <a:rPr lang="it-IT" sz="2400" dirty="0" smtClean="0"/>
-              <a:t> be </a:t>
+              <a:rPr lang="it-IT" sz="2400" dirty="0" smtClean="0"/>
+              <a:t>be </a:t>
             </a:r>
             <a:r>
               <a:rPr lang="it-IT" sz="2400" dirty="0" err="1" smtClean="0"/>
@@ -3864,7 +3865,19 @@
             </a:r>
             <a:r>
               <a:rPr lang="it-IT" sz="2400" dirty="0" smtClean="0"/>
-              <a:t> can cause </a:t>
+              <a:t> </a:t>
+            </a:r>
+            <a:r>
+              <a:rPr lang="it-IT" sz="2400" dirty="0" err="1" smtClean="0"/>
+              <a:t>could</a:t>
+            </a:r>
+            <a:r>
+              <a:rPr lang="it-IT" sz="2400" dirty="0" smtClean="0"/>
+              <a:t> </a:t>
+            </a:r>
+            <a:r>
+              <a:rPr lang="it-IT" sz="2400" dirty="0" smtClean="0"/>
+              <a:t>cause </a:t>
             </a:r>
             <a:r>
               <a:rPr lang="it-IT" sz="2400" dirty="0" err="1" smtClean="0"/>
@@ -4003,7 +4016,11 @@
             </a:r>
             <a:r>
               <a:rPr lang="it-IT" sz="2400" dirty="0" smtClean="0"/>
-              <a:t> the </a:t>
+              <a:t> </a:t>
+            </a:r>
+            <a:r>
+              <a:rPr lang="it-IT" sz="2400" dirty="0" smtClean="0"/>
+              <a:t>to the </a:t>
             </a:r>
             <a:r>
               <a:rPr lang="it-IT" sz="2400" dirty="0" err="1" smtClean="0"/>
@@ -4011,7 +4028,15 @@
             </a:r>
             <a:r>
               <a:rPr lang="it-IT" sz="2400" dirty="0" smtClean="0"/>
-              <a:t> with the information </a:t>
+              <a:t> </a:t>
+            </a:r>
+            <a:r>
+              <a:rPr lang="it-IT" sz="2400" dirty="0" smtClean="0"/>
+              <a:t>the </a:t>
+            </a:r>
+            <a:r>
+              <a:rPr lang="it-IT" sz="2400" dirty="0" smtClean="0"/>
+              <a:t>information </a:t>
             </a:r>
             <a:r>
               <a:rPr lang="it-IT" sz="2400" dirty="0" err="1" smtClean="0"/>
@@ -5544,65 +5569,13 @@
       </p:sp>
       <p:sp>
         <p:nvSpPr>
-          <p:cNvPr id="9" name="Rettangolo arrotondato 8"/>
-          <p:cNvSpPr/>
-          <p:nvPr/>
-        </p:nvSpPr>
-        <p:spPr>
-          <a:xfrm>
-            <a:off x="7679229" y="1714025"/>
-            <a:ext cx="1579418" cy="1440872"/>
-          </a:xfrm>
-          <a:prstGeom prst="roundRect">
-            <a:avLst/>
-          </a:prstGeom>
-        </p:spPr>
-        <p:style>
-          <a:lnRef idx="2">
-            <a:schemeClr val="accent1">
-              <a:shade val="50000"/>
-            </a:schemeClr>
-          </a:lnRef>
-          <a:fillRef idx="1">
-            <a:schemeClr val="accent1"/>
-          </a:fillRef>
-          <a:effectRef idx="0">
-            <a:schemeClr val="accent1"/>
-          </a:effectRef>
-          <a:fontRef idx="minor">
-            <a:schemeClr val="lt1"/>
-          </a:fontRef>
-        </p:style>
-        <p:txBody>
-          <a:bodyPr rtlCol="0" anchor="ctr"/>
-          <a:lstStyle/>
-          <a:p>
-            <a:pPr algn="ctr"/>
-            <a:r>
-              <a:rPr lang="it-IT" dirty="0" smtClean="0"/>
-              <a:t>D</a:t>
-            </a:r>
-            <a:r>
-              <a:rPr lang="it-IT" i="1" dirty="0" smtClean="0"/>
-              <a:t>B</a:t>
-            </a:r>
-            <a:r>
-              <a:rPr lang="it-IT" dirty="0" smtClean="0"/>
-              <a:t> MANAGER</a:t>
-            </a:r>
-            <a:endParaRPr lang="en-GB" dirty="0"/>
-          </a:p>
-        </p:txBody>
-      </p:sp>
-      <p:sp>
-        <p:nvSpPr>
           <p:cNvPr id="10" name="Rettangolo arrotondato 9"/>
           <p:cNvSpPr/>
           <p:nvPr/>
         </p:nvSpPr>
         <p:spPr>
           <a:xfrm>
-            <a:off x="9803330" y="1746353"/>
+            <a:off x="8865970" y="1606991"/>
             <a:ext cx="1330036" cy="1440872"/>
           </a:xfrm>
           <a:prstGeom prst="roundRect">
@@ -5803,43 +5776,6 @@
       </p:cxnSp>
       <p:cxnSp>
         <p:nvCxnSpPr>
-          <p:cNvPr id="25" name="Connettore 7 24"/>
-          <p:cNvCxnSpPr>
-            <a:stCxn id="5" idx="2"/>
-            <a:endCxn id="11" idx="1"/>
-          </p:cNvCxnSpPr>
-          <p:nvPr/>
-        </p:nvCxnSpPr>
-        <p:spPr>
-          <a:xfrm rot="16200000" flipH="1">
-            <a:off x="6575888" y="4334567"/>
-            <a:ext cx="711199" cy="1532427"/>
-          </a:xfrm>
-          <a:prstGeom prst="curvedConnector2">
-            <a:avLst/>
-          </a:prstGeom>
-          <a:ln>
-            <a:headEnd type="triangle"/>
-            <a:tailEnd type="triangle"/>
-          </a:ln>
-        </p:spPr>
-        <p:style>
-          <a:lnRef idx="3">
-            <a:schemeClr val="accent3"/>
-          </a:lnRef>
-          <a:fillRef idx="0">
-            <a:schemeClr val="accent3"/>
-          </a:fillRef>
-          <a:effectRef idx="2">
-            <a:schemeClr val="accent3"/>
-          </a:effectRef>
-          <a:fontRef idx="minor">
-            <a:schemeClr val="tx1"/>
-          </a:fontRef>
-        </p:style>
-      </p:cxnSp>
-      <p:cxnSp>
-        <p:nvCxnSpPr>
           <p:cNvPr id="29" name="Connettore 7 28"/>
           <p:cNvCxnSpPr>
             <a:stCxn id="11" idx="3"/>
@@ -5877,54 +5813,17 @@
       </p:cxnSp>
       <p:cxnSp>
         <p:nvCxnSpPr>
-          <p:cNvPr id="31" name="Connettore 7 30"/>
-          <p:cNvCxnSpPr>
-            <a:stCxn id="9" idx="3"/>
-            <a:endCxn id="10" idx="1"/>
-          </p:cNvCxnSpPr>
-          <p:nvPr/>
-        </p:nvCxnSpPr>
-        <p:spPr>
-          <a:xfrm>
-            <a:off x="9258647" y="2434461"/>
-            <a:ext cx="544683" cy="32328"/>
-          </a:xfrm>
-          <a:prstGeom prst="curvedConnector3">
-            <a:avLst/>
-          </a:prstGeom>
-          <a:ln>
-            <a:headEnd type="triangle"/>
-            <a:tailEnd type="triangle"/>
-          </a:ln>
-        </p:spPr>
-        <p:style>
-          <a:lnRef idx="3">
-            <a:schemeClr val="accent3"/>
-          </a:lnRef>
-          <a:fillRef idx="0">
-            <a:schemeClr val="accent3"/>
-          </a:fillRef>
-          <a:effectRef idx="2">
-            <a:schemeClr val="accent3"/>
-          </a:effectRef>
-          <a:fontRef idx="minor">
-            <a:schemeClr val="tx1"/>
-          </a:fontRef>
-        </p:style>
-      </p:cxnSp>
-      <p:cxnSp>
-        <p:nvCxnSpPr>
           <p:cNvPr id="33" name="Connettore 7 32"/>
           <p:cNvCxnSpPr>
-            <a:stCxn id="9" idx="1"/>
+            <a:stCxn id="10" idx="1"/>
             <a:endCxn id="5" idx="3"/>
           </p:cNvCxnSpPr>
           <p:nvPr/>
         </p:nvCxnSpPr>
         <p:spPr>
           <a:xfrm rot="10800000" flipV="1">
-            <a:off x="6978073" y="2434460"/>
-            <a:ext cx="701156" cy="1171525"/>
+            <a:off x="6978074" y="2327426"/>
+            <a:ext cx="1887897" cy="1278559"/>
           </a:xfrm>
           <a:prstGeom prst="curvedConnector3">
             <a:avLst/>
@@ -6068,50 +5967,6 @@
       </p:cxnSp>
       <p:sp>
         <p:nvSpPr>
-          <p:cNvPr id="43" name="Rettangolo 42"/>
-          <p:cNvSpPr/>
-          <p:nvPr/>
-        </p:nvSpPr>
-        <p:spPr>
-          <a:xfrm>
-            <a:off x="6650182" y="5366327"/>
-            <a:ext cx="327891" cy="304800"/>
-          </a:xfrm>
-          <a:prstGeom prst="rect">
-            <a:avLst/>
-          </a:prstGeom>
-        </p:spPr>
-        <p:style>
-          <a:lnRef idx="2">
-            <a:schemeClr val="accent6">
-              <a:shade val="50000"/>
-            </a:schemeClr>
-          </a:lnRef>
-          <a:fillRef idx="1">
-            <a:schemeClr val="accent6"/>
-          </a:fillRef>
-          <a:effectRef idx="0">
-            <a:schemeClr val="accent6"/>
-          </a:effectRef>
-          <a:fontRef idx="minor">
-            <a:schemeClr val="lt1"/>
-          </a:fontRef>
-        </p:style>
-        <p:txBody>
-          <a:bodyPr rtlCol="0" anchor="ctr"/>
-          <a:lstStyle/>
-          <a:p>
-            <a:pPr algn="ctr"/>
-            <a:r>
-              <a:rPr lang="it-IT" dirty="0" smtClean="0"/>
-              <a:t>W</a:t>
-            </a:r>
-            <a:endParaRPr lang="en-GB" dirty="0"/>
-          </a:p>
-        </p:txBody>
-      </p:sp>
-      <p:sp>
-        <p:nvSpPr>
           <p:cNvPr id="47" name="Rettangolo 46"/>
           <p:cNvSpPr/>
           <p:nvPr/>
@@ -6227,8 +6082,8 @@
         </p:nvCxnSpPr>
         <p:spPr>
           <a:xfrm rot="5400000">
-            <a:off x="8698901" y="2966498"/>
-            <a:ext cx="1548720" cy="1990174"/>
+            <a:off x="8160540" y="3365497"/>
+            <a:ext cx="1688082" cy="1052814"/>
           </a:xfrm>
           <a:prstGeom prst="curvedConnector3">
             <a:avLst/>
@@ -6253,6 +6108,53 @@
           </a:fontRef>
         </p:style>
       </p:cxnSp>
+      <p:sp>
+        <p:nvSpPr>
+          <p:cNvPr id="20" name="Rettangolo 19"/>
+          <p:cNvSpPr/>
+          <p:nvPr/>
+        </p:nvSpPr>
+        <p:spPr>
+          <a:xfrm>
+            <a:off x="7679229" y="2466789"/>
+            <a:ext cx="273280" cy="252367"/>
+          </a:xfrm>
+          <a:prstGeom prst="rect">
+            <a:avLst/>
+          </a:prstGeom>
+          <a:solidFill>
+            <a:schemeClr val="accent6"/>
+          </a:solidFill>
+        </p:spPr>
+        <p:style>
+          <a:lnRef idx="2">
+            <a:schemeClr val="accent1">
+              <a:shade val="50000"/>
+            </a:schemeClr>
+          </a:lnRef>
+          <a:fillRef idx="1">
+            <a:schemeClr val="accent1"/>
+          </a:fillRef>
+          <a:effectRef idx="0">
+            <a:schemeClr val="accent1"/>
+          </a:effectRef>
+          <a:fontRef idx="minor">
+            <a:schemeClr val="lt1"/>
+          </a:fontRef>
+        </p:style>
+        <p:txBody>
+          <a:bodyPr rtlCol="0" anchor="ctr"/>
+          <a:lstStyle/>
+          <a:p>
+            <a:pPr algn="ctr"/>
+            <a:r>
+              <a:rPr lang="it-IT" dirty="0"/>
+              <a:t>w</a:t>
+            </a:r>
+            <a:endParaRPr lang="en-GB" dirty="0"/>
+          </a:p>
+        </p:txBody>
+      </p:sp>
     </p:spTree>
     <p:extLst>
       <p:ext uri="{BB962C8B-B14F-4D97-AF65-F5344CB8AC3E}">
@@ -6415,7 +6317,7 @@
         <p:spPr>
           <a:xfrm>
             <a:off x="838200" y="1981200"/>
-            <a:ext cx="10515600" cy="4247317"/>
+            <a:ext cx="10515600" cy="3970318"/>
           </a:xfrm>
           <a:prstGeom prst="rect">
             <a:avLst/>
@@ -6454,8 +6356,29 @@
             </a:r>
             <a:r>
               <a:rPr lang="en-GB" dirty="0"/>
-              <a:t>hoc sensors placed in the room and so will be for temperature and humidity.</a:t>
-            </a:r>
+              <a:t>hoc sensors placed in the </a:t>
+            </a:r>
+            <a:r>
+              <a:rPr lang="en-GB" dirty="0" smtClean="0"/>
+              <a:t>room. </a:t>
+            </a:r>
+            <a:r>
+              <a:rPr lang="it-IT" b="1" u="sng" cap="all" dirty="0" err="1" smtClean="0"/>
+              <a:t>Reasoning</a:t>
+            </a:r>
+            <a:endParaRPr lang="it-IT" b="1" u="sng" cap="all" dirty="0" smtClean="0"/>
+          </a:p>
+          <a:p>
+            <a:pPr algn="just"/>
+            <a:r>
+              <a:rPr lang="en-GB" dirty="0"/>
+              <a:t>On the base of what the sensors read, the system will analyse data and detect dangerous situations from which an attack could grow </a:t>
+            </a:r>
+            <a:r>
+              <a:rPr lang="en-GB" dirty="0" smtClean="0"/>
+              <a:t>up.</a:t>
+            </a:r>
+            <a:endParaRPr lang="en-GB" cap="all" dirty="0" smtClean="0"/>
           </a:p>
           <a:p>
             <a:pPr marL="285750" indent="-285750" algn="just">
@@ -6463,18 +6386,34 @@
               <a:buChar char="•"/>
             </a:pPr>
             <a:r>
-              <a:rPr lang="it-IT" b="1" u="sng" cap="all" dirty="0" err="1" smtClean="0"/>
-              <a:t>Reasoning</a:t>
-            </a:r>
-            <a:endParaRPr lang="it-IT" b="1" u="sng" cap="all" dirty="0" smtClean="0"/>
+              <a:rPr lang="en-GB" b="1" u="sng" cap="all" dirty="0" smtClean="0"/>
+              <a:t>ACTING</a:t>
+            </a:r>
+            <a:endParaRPr lang="en-GB" b="1" u="sng" cap="all" dirty="0"/>
           </a:p>
           <a:p>
             <a:pPr algn="just"/>
             <a:r>
               <a:rPr lang="en-GB" dirty="0"/>
-              <a:t>On the base of what the sensors read, the system will analyse data and detect dangerous situations from which an attack could grow up</a:t>
-            </a:r>
-            <a:endParaRPr lang="en-GB" cap="all" dirty="0" smtClean="0"/>
+              <a:t>If a hot situation is detected during the reasoning phase the system will aim at adjusting the </a:t>
+            </a:r>
+            <a:r>
+              <a:rPr lang="en-GB" dirty="0" smtClean="0"/>
+              <a:t>air </a:t>
+            </a:r>
+            <a:r>
+              <a:rPr lang="en-GB" dirty="0"/>
+              <a:t>composition </a:t>
+            </a:r>
+            <a:r>
+              <a:rPr lang="en-GB" dirty="0" smtClean="0"/>
+              <a:t>in the </a:t>
+            </a:r>
+            <a:r>
+              <a:rPr lang="en-GB" dirty="0" smtClean="0"/>
+              <a:t>room through the sensors installed.</a:t>
+            </a:r>
+            <a:endParaRPr lang="en-GB" dirty="0" smtClean="0"/>
           </a:p>
           <a:p>
             <a:pPr marL="285750" indent="-285750" algn="just">
@@ -6483,36 +6422,6 @@
             </a:pPr>
             <a:r>
               <a:rPr lang="en-GB" b="1" u="sng" cap="all" dirty="0" smtClean="0"/>
-              <a:t>ACTING</a:t>
-            </a:r>
-            <a:endParaRPr lang="en-GB" b="1" u="sng" cap="all" dirty="0"/>
-          </a:p>
-          <a:p>
-            <a:pPr algn="just"/>
-            <a:r>
-              <a:rPr lang="en-GB" dirty="0"/>
-              <a:t>If a hot situation is detected during the reasoning phase the system will aim at adjusting the </a:t>
-            </a:r>
-            <a:r>
-              <a:rPr lang="en-GB" dirty="0" smtClean="0"/>
-              <a:t>air </a:t>
-            </a:r>
-            <a:r>
-              <a:rPr lang="en-GB" dirty="0"/>
-              <a:t>composition </a:t>
-            </a:r>
-            <a:r>
-              <a:rPr lang="en-GB" dirty="0" smtClean="0"/>
-              <a:t>in the room.</a:t>
-            </a:r>
-          </a:p>
-          <a:p>
-            <a:pPr marL="285750" indent="-285750" algn="just">
-              <a:buFont typeface="Arial" panose="020B0604020202020204" pitchFamily="34" charset="0"/>
-              <a:buChar char="•"/>
-            </a:pPr>
-            <a:r>
-              <a:rPr lang="en-GB" b="1" u="sng" cap="all" dirty="0" smtClean="0"/>
               <a:t>INTERACTING</a:t>
             </a:r>
             <a:endParaRPr lang="en-GB" b="1" u="sng" cap="all" dirty="0"/>
@@ -6537,7 +6446,11 @@
             </a:r>
             <a:r>
               <a:rPr lang="en-GB" dirty="0" smtClean="0"/>
-              <a:t>is subject to regulations by the user, which can be done in the two described ways.</a:t>
+              <a:t>be </a:t>
+            </a:r>
+            <a:r>
+              <a:rPr lang="en-GB" dirty="0" smtClean="0"/>
+              <a:t>subject to regulations by the user, which can be done in the two described ways.</a:t>
             </a:r>
             <a:endParaRPr lang="en-GB" dirty="0"/>
           </a:p>
@@ -6664,6 +6577,740 @@
                 <a:schemeClr val="accent1"/>
               </a:solidFill>
             </a:endParaRPr>
+          </a:p>
+        </p:txBody>
+      </p:sp>
+      <p:sp>
+        <p:nvSpPr>
+          <p:cNvPr id="4" name="CasellaDiTesto 3"/>
+          <p:cNvSpPr txBox="1"/>
+          <p:nvPr/>
+        </p:nvSpPr>
+        <p:spPr>
+          <a:xfrm>
+            <a:off x="838200" y="1902691"/>
+            <a:ext cx="10515600" cy="4154984"/>
+          </a:xfrm>
+          <a:prstGeom prst="rect">
+            <a:avLst/>
+          </a:prstGeom>
+          <a:noFill/>
+        </p:spPr>
+        <p:txBody>
+          <a:bodyPr wrap="square" rtlCol="0">
+            <a:spAutoFit/>
+          </a:bodyPr>
+          <a:lstStyle/>
+          <a:p>
+            <a:pPr algn="just"/>
+            <a:r>
+              <a:rPr lang="it-IT" sz="2400" dirty="0" err="1" smtClean="0"/>
+              <a:t>FtB</a:t>
+            </a:r>
+            <a:r>
+              <a:rPr lang="it-IT" sz="2400" dirty="0" smtClean="0"/>
+              <a:t> </a:t>
+            </a:r>
+            <a:r>
+              <a:rPr lang="it-IT" sz="2400" dirty="0" err="1" smtClean="0"/>
+              <a:t>is</a:t>
+            </a:r>
+            <a:r>
+              <a:rPr lang="it-IT" sz="2400" dirty="0" smtClean="0"/>
+              <a:t> </a:t>
+            </a:r>
+            <a:r>
+              <a:rPr lang="it-IT" sz="2400" dirty="0" err="1" smtClean="0"/>
+              <a:t>mainly</a:t>
+            </a:r>
+            <a:r>
+              <a:rPr lang="it-IT" sz="2400" dirty="0" smtClean="0"/>
+              <a:t> </a:t>
+            </a:r>
+            <a:r>
+              <a:rPr lang="it-IT" sz="2400" dirty="0" err="1" smtClean="0"/>
+              <a:t>intended</a:t>
+            </a:r>
+            <a:r>
+              <a:rPr lang="it-IT" sz="2400" dirty="0" smtClean="0"/>
+              <a:t> to be a </a:t>
+            </a:r>
+            <a:r>
+              <a:rPr lang="it-IT" sz="2400" dirty="0" err="1" smtClean="0"/>
+              <a:t>valuable</a:t>
+            </a:r>
+            <a:r>
+              <a:rPr lang="it-IT" sz="2400" dirty="0" smtClean="0"/>
+              <a:t> help in </a:t>
+            </a:r>
+            <a:r>
+              <a:rPr lang="it-IT" sz="2400" dirty="0" err="1" smtClean="0"/>
+              <a:t>everyday</a:t>
+            </a:r>
+            <a:r>
+              <a:rPr lang="it-IT" sz="2400" dirty="0"/>
+              <a:t> </a:t>
+            </a:r>
+            <a:r>
+              <a:rPr lang="it-IT" sz="2400" dirty="0" smtClean="0"/>
+              <a:t>life: </a:t>
+            </a:r>
+            <a:r>
+              <a:rPr lang="it-IT" sz="2400" dirty="0" err="1" smtClean="0"/>
+              <a:t>it</a:t>
+            </a:r>
+            <a:r>
+              <a:rPr lang="it-IT" sz="2400" dirty="0" smtClean="0"/>
+              <a:t> </a:t>
+            </a:r>
+            <a:r>
+              <a:rPr lang="it-IT" sz="2400" dirty="0" err="1" smtClean="0"/>
+              <a:t>will</a:t>
+            </a:r>
+            <a:r>
+              <a:rPr lang="it-IT" sz="2400" dirty="0" smtClean="0"/>
+              <a:t> </a:t>
+            </a:r>
+            <a:r>
+              <a:rPr lang="it-IT" sz="2400" dirty="0" err="1" smtClean="0"/>
+              <a:t>constantly</a:t>
+            </a:r>
+            <a:r>
+              <a:rPr lang="it-IT" sz="2400" dirty="0" smtClean="0"/>
+              <a:t> </a:t>
+            </a:r>
+            <a:r>
+              <a:rPr lang="it-IT" sz="2400" dirty="0" err="1" smtClean="0"/>
+              <a:t>scan</a:t>
+            </a:r>
+            <a:r>
+              <a:rPr lang="it-IT" sz="2400" dirty="0" smtClean="0"/>
+              <a:t> the room in </a:t>
+            </a:r>
+            <a:r>
+              <a:rPr lang="it-IT" sz="2400" dirty="0" err="1" smtClean="0"/>
+              <a:t>order</a:t>
+            </a:r>
+            <a:r>
+              <a:rPr lang="it-IT" sz="2400" dirty="0" smtClean="0"/>
+              <a:t> to </a:t>
+            </a:r>
+            <a:r>
+              <a:rPr lang="it-IT" sz="2400" dirty="0" err="1" smtClean="0"/>
+              <a:t>avoid</a:t>
+            </a:r>
+            <a:r>
+              <a:rPr lang="it-IT" sz="2400" dirty="0" smtClean="0"/>
+              <a:t> the </a:t>
+            </a:r>
+            <a:r>
+              <a:rPr lang="it-IT" sz="2400" dirty="0" err="1" smtClean="0"/>
+              <a:t>incoming</a:t>
+            </a:r>
+            <a:r>
+              <a:rPr lang="it-IT" sz="2400" dirty="0" smtClean="0"/>
+              <a:t> of an </a:t>
+            </a:r>
+            <a:r>
+              <a:rPr lang="it-IT" sz="2400" dirty="0" err="1" smtClean="0"/>
+              <a:t>allergic</a:t>
+            </a:r>
+            <a:r>
+              <a:rPr lang="it-IT" sz="2400" dirty="0" smtClean="0"/>
+              <a:t> </a:t>
+            </a:r>
+            <a:r>
+              <a:rPr lang="it-IT" sz="2400" dirty="0" err="1" smtClean="0"/>
+              <a:t>attack</a:t>
+            </a:r>
+            <a:r>
+              <a:rPr lang="it-IT" sz="2400" dirty="0" smtClean="0"/>
+              <a:t> and </a:t>
+            </a:r>
+            <a:r>
+              <a:rPr lang="it-IT" sz="2400" dirty="0" err="1" smtClean="0"/>
+              <a:t>it</a:t>
+            </a:r>
+            <a:r>
+              <a:rPr lang="it-IT" sz="2400" dirty="0" smtClean="0"/>
+              <a:t> </a:t>
+            </a:r>
+            <a:r>
+              <a:rPr lang="it-IT" sz="2400" dirty="0" err="1" smtClean="0"/>
+              <a:t>will</a:t>
+            </a:r>
+            <a:r>
+              <a:rPr lang="it-IT" sz="2400" dirty="0" smtClean="0"/>
+              <a:t> do </a:t>
+            </a:r>
+            <a:r>
+              <a:rPr lang="it-IT" sz="2400" dirty="0" err="1" smtClean="0"/>
+              <a:t>it</a:t>
+            </a:r>
+            <a:r>
+              <a:rPr lang="it-IT" sz="2400" dirty="0" smtClean="0"/>
+              <a:t> </a:t>
+            </a:r>
+            <a:r>
+              <a:rPr lang="it-IT" sz="2400" dirty="0" err="1" smtClean="0"/>
+              <a:t>responding</a:t>
+            </a:r>
+            <a:r>
+              <a:rPr lang="it-IT" sz="2400" dirty="0" smtClean="0"/>
+              <a:t> to the </a:t>
+            </a:r>
+            <a:r>
+              <a:rPr lang="it-IT" sz="2400" dirty="0" err="1" smtClean="0"/>
+              <a:t>needs</a:t>
+            </a:r>
+            <a:r>
+              <a:rPr lang="it-IT" sz="2400" dirty="0" smtClean="0"/>
+              <a:t> of the </a:t>
+            </a:r>
+            <a:r>
+              <a:rPr lang="it-IT" sz="2400" dirty="0" err="1" smtClean="0"/>
+              <a:t>user</a:t>
+            </a:r>
+            <a:r>
+              <a:rPr lang="it-IT" sz="2400" dirty="0" smtClean="0"/>
+              <a:t>, </a:t>
+            </a:r>
+            <a:r>
+              <a:rPr lang="it-IT" sz="2400" dirty="0" err="1" smtClean="0"/>
+              <a:t>who</a:t>
+            </a:r>
+            <a:r>
+              <a:rPr lang="it-IT" sz="2400" dirty="0" smtClean="0"/>
+              <a:t> can </a:t>
+            </a:r>
+            <a:r>
+              <a:rPr lang="it-IT" sz="2400" dirty="0" err="1" smtClean="0"/>
+              <a:t>provide</a:t>
+            </a:r>
+            <a:r>
+              <a:rPr lang="it-IT" sz="2400" dirty="0" smtClean="0"/>
+              <a:t> to </a:t>
+            </a:r>
+            <a:r>
+              <a:rPr lang="it-IT" sz="2400" dirty="0" err="1" smtClean="0"/>
+              <a:t>suitable</a:t>
+            </a:r>
+            <a:r>
+              <a:rPr lang="it-IT" sz="2400" dirty="0" smtClean="0"/>
+              <a:t> </a:t>
+            </a:r>
+            <a:r>
+              <a:rPr lang="it-IT" sz="2400" dirty="0" err="1" smtClean="0"/>
+              <a:t>regulations</a:t>
+            </a:r>
+            <a:r>
+              <a:rPr lang="it-IT" sz="2400" dirty="0" smtClean="0"/>
+              <a:t> in </a:t>
+            </a:r>
+            <a:r>
+              <a:rPr lang="it-IT" sz="2400" dirty="0" err="1" smtClean="0"/>
+              <a:t>order</a:t>
+            </a:r>
+            <a:r>
+              <a:rPr lang="it-IT" sz="2400" dirty="0" smtClean="0"/>
+              <a:t> to </a:t>
+            </a:r>
+            <a:r>
+              <a:rPr lang="it-IT" sz="2400" dirty="0" err="1" smtClean="0"/>
+              <a:t>make</a:t>
+            </a:r>
+            <a:r>
+              <a:rPr lang="it-IT" sz="2400" dirty="0" smtClean="0"/>
+              <a:t> the </a:t>
+            </a:r>
+            <a:r>
+              <a:rPr lang="it-IT" sz="2400" dirty="0" err="1" smtClean="0"/>
+              <a:t>device</a:t>
+            </a:r>
+            <a:r>
+              <a:rPr lang="it-IT" sz="2400" dirty="0" smtClean="0"/>
+              <a:t> </a:t>
+            </a:r>
+            <a:r>
+              <a:rPr lang="it-IT" sz="2400" dirty="0" err="1" smtClean="0"/>
+              <a:t>act</a:t>
+            </a:r>
+            <a:r>
+              <a:rPr lang="it-IT" sz="2400" dirty="0" smtClean="0"/>
+              <a:t> </a:t>
+            </a:r>
+            <a:r>
+              <a:rPr lang="it-IT" sz="2400" dirty="0" err="1" smtClean="0"/>
+              <a:t>as</a:t>
+            </a:r>
+            <a:r>
+              <a:rPr lang="it-IT" sz="2400" dirty="0" smtClean="0"/>
+              <a:t> </a:t>
+            </a:r>
+            <a:r>
+              <a:rPr lang="it-IT" sz="2400" dirty="0" err="1" smtClean="0"/>
+              <a:t>it</a:t>
+            </a:r>
+            <a:r>
+              <a:rPr lang="it-IT" sz="2400" dirty="0" smtClean="0"/>
+              <a:t> </a:t>
+            </a:r>
+            <a:r>
+              <a:rPr lang="it-IT" sz="2400" dirty="0" err="1" smtClean="0"/>
+              <a:t>most</a:t>
+            </a:r>
+            <a:r>
+              <a:rPr lang="it-IT" sz="2400" dirty="0" smtClean="0"/>
+              <a:t> </a:t>
+            </a:r>
+            <a:r>
+              <a:rPr lang="it-IT" sz="2400" dirty="0" err="1" smtClean="0"/>
+              <a:t>pleases</a:t>
+            </a:r>
+            <a:r>
+              <a:rPr lang="it-IT" sz="2400" dirty="0" smtClean="0"/>
+              <a:t> </a:t>
+            </a:r>
+            <a:r>
+              <a:rPr lang="it-IT" sz="2400" dirty="0" err="1" smtClean="0"/>
+              <a:t>him</a:t>
+            </a:r>
+            <a:r>
+              <a:rPr lang="it-IT" sz="2400" dirty="0" smtClean="0"/>
+              <a:t>.</a:t>
+            </a:r>
+          </a:p>
+          <a:p>
+            <a:pPr algn="just"/>
+            <a:endParaRPr lang="it-IT" sz="2400" dirty="0"/>
+          </a:p>
+          <a:p>
+            <a:pPr algn="just"/>
+            <a:r>
+              <a:rPr lang="it-IT" sz="2400" dirty="0" smtClean="0"/>
+              <a:t>On the </a:t>
+            </a:r>
+            <a:r>
+              <a:rPr lang="it-IT" sz="2400" dirty="0" err="1" smtClean="0"/>
+              <a:t>other</a:t>
+            </a:r>
+            <a:r>
+              <a:rPr lang="it-IT" sz="2400" dirty="0" smtClean="0"/>
+              <a:t> </a:t>
+            </a:r>
+            <a:r>
+              <a:rPr lang="it-IT" sz="2400" dirty="0" err="1" smtClean="0"/>
+              <a:t>hand</a:t>
+            </a:r>
+            <a:r>
+              <a:rPr lang="it-IT" sz="2400" dirty="0" smtClean="0"/>
+              <a:t>, </a:t>
+            </a:r>
+            <a:r>
+              <a:rPr lang="it-IT" sz="2400" dirty="0" err="1" smtClean="0"/>
+              <a:t>FtB</a:t>
+            </a:r>
+            <a:r>
+              <a:rPr lang="it-IT" sz="2400" dirty="0" smtClean="0"/>
+              <a:t> </a:t>
+            </a:r>
+            <a:r>
+              <a:rPr lang="it-IT" sz="2400" dirty="0" err="1" smtClean="0"/>
+              <a:t>wants</a:t>
+            </a:r>
+            <a:r>
+              <a:rPr lang="it-IT" sz="2400" dirty="0" smtClean="0"/>
+              <a:t> to be a </a:t>
+            </a:r>
+            <a:r>
+              <a:rPr lang="it-IT" sz="2400" dirty="0" err="1" smtClean="0"/>
+              <a:t>smart</a:t>
+            </a:r>
+            <a:r>
+              <a:rPr lang="it-IT" sz="2400" dirty="0" smtClean="0"/>
+              <a:t> </a:t>
+            </a:r>
+            <a:r>
+              <a:rPr lang="it-IT" sz="2400" dirty="0" err="1" smtClean="0"/>
+              <a:t>device</a:t>
+            </a:r>
+            <a:r>
+              <a:rPr lang="it-IT" sz="2400" dirty="0" smtClean="0"/>
+              <a:t>, </a:t>
+            </a:r>
+            <a:r>
+              <a:rPr lang="it-IT" sz="2400" dirty="0" err="1" smtClean="0"/>
+              <a:t>not</a:t>
+            </a:r>
+            <a:r>
+              <a:rPr lang="it-IT" sz="2400" dirty="0" smtClean="0"/>
+              <a:t> </a:t>
+            </a:r>
+            <a:r>
+              <a:rPr lang="it-IT" sz="2400" dirty="0" err="1" smtClean="0"/>
+              <a:t>simply</a:t>
+            </a:r>
+            <a:r>
+              <a:rPr lang="it-IT" sz="2400" dirty="0" smtClean="0"/>
+              <a:t> an </a:t>
+            </a:r>
+            <a:r>
+              <a:rPr lang="it-IT" sz="2400" dirty="0" err="1" smtClean="0"/>
+              <a:t>automatic</a:t>
+            </a:r>
+            <a:r>
+              <a:rPr lang="it-IT" sz="2400" dirty="0" smtClean="0"/>
+              <a:t> </a:t>
+            </a:r>
+            <a:r>
+              <a:rPr lang="it-IT" sz="2400" dirty="0" err="1" smtClean="0"/>
+              <a:t>device</a:t>
+            </a:r>
+            <a:r>
+              <a:rPr lang="it-IT" sz="2400" dirty="0" smtClean="0"/>
+              <a:t>: </a:t>
+            </a:r>
+            <a:r>
+              <a:rPr lang="it-IT" sz="2400" dirty="0" err="1" smtClean="0"/>
+              <a:t>it</a:t>
+            </a:r>
+            <a:r>
+              <a:rPr lang="it-IT" sz="2400" dirty="0" smtClean="0"/>
+              <a:t> </a:t>
+            </a:r>
+            <a:r>
+              <a:rPr lang="it-IT" sz="2400" dirty="0" err="1" smtClean="0"/>
+              <a:t>will</a:t>
+            </a:r>
+            <a:r>
+              <a:rPr lang="it-IT" sz="2400" dirty="0" smtClean="0"/>
+              <a:t> </a:t>
+            </a:r>
+            <a:r>
+              <a:rPr lang="it-IT" sz="2400" dirty="0" err="1" smtClean="0"/>
+              <a:t>analyze</a:t>
+            </a:r>
+            <a:r>
+              <a:rPr lang="it-IT" sz="2400" dirty="0" smtClean="0"/>
+              <a:t> the </a:t>
+            </a:r>
+            <a:r>
+              <a:rPr lang="it-IT" sz="2400" dirty="0" err="1" smtClean="0"/>
+              <a:t>conditions</a:t>
+            </a:r>
+            <a:r>
+              <a:rPr lang="it-IT" sz="2400" dirty="0" smtClean="0"/>
+              <a:t> of the </a:t>
+            </a:r>
+            <a:r>
+              <a:rPr lang="it-IT" sz="2400" dirty="0" err="1" smtClean="0"/>
+              <a:t>environment</a:t>
+            </a:r>
+            <a:r>
+              <a:rPr lang="it-IT" sz="2400" dirty="0" smtClean="0"/>
+              <a:t> </a:t>
+            </a:r>
+            <a:r>
+              <a:rPr lang="it-IT" sz="2400" dirty="0" err="1" smtClean="0"/>
+              <a:t>where</a:t>
+            </a:r>
+            <a:r>
+              <a:rPr lang="it-IT" sz="2400" dirty="0" smtClean="0"/>
+              <a:t> </a:t>
+            </a:r>
+            <a:r>
+              <a:rPr lang="it-IT" sz="2400" dirty="0" err="1" smtClean="0"/>
+              <a:t>it</a:t>
+            </a:r>
+            <a:r>
+              <a:rPr lang="it-IT" sz="2400" dirty="0" smtClean="0"/>
+              <a:t> </a:t>
+            </a:r>
+            <a:r>
+              <a:rPr lang="it-IT" sz="2400" dirty="0" err="1" smtClean="0"/>
+              <a:t>is</a:t>
+            </a:r>
+            <a:r>
+              <a:rPr lang="it-IT" sz="2400" dirty="0" smtClean="0"/>
+              <a:t> </a:t>
+            </a:r>
+            <a:r>
+              <a:rPr lang="it-IT" sz="2400" dirty="0" err="1" smtClean="0"/>
+              <a:t>placed</a:t>
+            </a:r>
+            <a:r>
+              <a:rPr lang="it-IT" sz="2400" dirty="0" smtClean="0"/>
+              <a:t> in a </a:t>
+            </a:r>
+            <a:r>
+              <a:rPr lang="it-IT" sz="2400" dirty="0" err="1" smtClean="0"/>
+              <a:t>crytical</a:t>
+            </a:r>
+            <a:r>
+              <a:rPr lang="it-IT" sz="2400" dirty="0" smtClean="0"/>
+              <a:t> way, in </a:t>
+            </a:r>
+            <a:r>
+              <a:rPr lang="it-IT" sz="2400" dirty="0" err="1" smtClean="0"/>
+              <a:t>order</a:t>
+            </a:r>
+            <a:r>
+              <a:rPr lang="it-IT" sz="2400" dirty="0" smtClean="0"/>
+              <a:t> to </a:t>
+            </a:r>
+            <a:r>
+              <a:rPr lang="it-IT" sz="2400" dirty="0" err="1" smtClean="0"/>
+              <a:t>avoid</a:t>
+            </a:r>
+            <a:r>
+              <a:rPr lang="it-IT" sz="2400" dirty="0" smtClean="0"/>
+              <a:t> </a:t>
+            </a:r>
+            <a:r>
+              <a:rPr lang="it-IT" sz="2400" dirty="0" err="1" smtClean="0"/>
+              <a:t>useless</a:t>
+            </a:r>
+            <a:r>
+              <a:rPr lang="it-IT" sz="2400" dirty="0" smtClean="0"/>
+              <a:t> </a:t>
+            </a:r>
+            <a:r>
+              <a:rPr lang="it-IT" sz="2400" dirty="0" err="1" smtClean="0"/>
+              <a:t>actions</a:t>
+            </a:r>
+            <a:r>
+              <a:rPr lang="it-IT" sz="2400" dirty="0" smtClean="0"/>
+              <a:t>. To </a:t>
+            </a:r>
+            <a:r>
+              <a:rPr lang="it-IT" sz="2400" dirty="0" err="1" smtClean="0"/>
+              <a:t>make</a:t>
+            </a:r>
+            <a:r>
+              <a:rPr lang="it-IT" sz="2400" dirty="0" smtClean="0"/>
+              <a:t> </a:t>
+            </a:r>
+            <a:r>
+              <a:rPr lang="it-IT" sz="2400" dirty="0" err="1" smtClean="0"/>
+              <a:t>it</a:t>
+            </a:r>
+            <a:r>
+              <a:rPr lang="it-IT" sz="2400" dirty="0" smtClean="0"/>
+              <a:t> </a:t>
+            </a:r>
+            <a:r>
+              <a:rPr lang="it-IT" sz="2400" dirty="0" err="1" smtClean="0"/>
+              <a:t>clear</a:t>
+            </a:r>
+            <a:r>
+              <a:rPr lang="it-IT" sz="2400" dirty="0" smtClean="0"/>
+              <a:t> with an </a:t>
+            </a:r>
+            <a:r>
+              <a:rPr lang="it-IT" sz="2400" dirty="0" err="1" smtClean="0"/>
+              <a:t>example</a:t>
+            </a:r>
+            <a:r>
+              <a:rPr lang="it-IT" sz="2400" dirty="0" smtClean="0"/>
+              <a:t>: </a:t>
+            </a:r>
+            <a:r>
+              <a:rPr lang="it-IT" sz="2400" dirty="0" err="1" smtClean="0"/>
+              <a:t>if</a:t>
+            </a:r>
+            <a:r>
+              <a:rPr lang="it-IT" sz="2400" dirty="0" smtClean="0"/>
+              <a:t> </a:t>
+            </a:r>
+            <a:r>
+              <a:rPr lang="it-IT" sz="2400" dirty="0" err="1" smtClean="0"/>
+              <a:t>during</a:t>
+            </a:r>
+            <a:r>
+              <a:rPr lang="it-IT" sz="2400" dirty="0" smtClean="0"/>
+              <a:t> the </a:t>
+            </a:r>
+            <a:r>
+              <a:rPr lang="it-IT" sz="2400" dirty="0" err="1" smtClean="0"/>
+              <a:t>pollen</a:t>
+            </a:r>
+            <a:r>
+              <a:rPr lang="it-IT" sz="2400" dirty="0" smtClean="0"/>
+              <a:t> season a </a:t>
+            </a:r>
+            <a:r>
+              <a:rPr lang="it-IT" sz="2400" dirty="0" err="1" smtClean="0"/>
+              <a:t>window</a:t>
+            </a:r>
+            <a:r>
+              <a:rPr lang="it-IT" sz="2400" dirty="0" smtClean="0"/>
+              <a:t> </a:t>
+            </a:r>
+            <a:r>
+              <a:rPr lang="it-IT" sz="2400" dirty="0" err="1" smtClean="0"/>
+              <a:t>is</a:t>
+            </a:r>
+            <a:r>
+              <a:rPr lang="it-IT" sz="2400" dirty="0" smtClean="0"/>
+              <a:t> open </a:t>
+            </a:r>
+            <a:r>
+              <a:rPr lang="it-IT" sz="2400" dirty="0" err="1" smtClean="0"/>
+              <a:t>it</a:t>
+            </a:r>
+            <a:r>
+              <a:rPr lang="it-IT" sz="2400" dirty="0" smtClean="0"/>
+              <a:t> </a:t>
+            </a:r>
+            <a:r>
+              <a:rPr lang="it-IT" sz="2400" dirty="0" err="1" smtClean="0"/>
+              <a:t>will</a:t>
+            </a:r>
+            <a:r>
+              <a:rPr lang="it-IT" sz="2400" dirty="0" smtClean="0"/>
+              <a:t> be </a:t>
+            </a:r>
+            <a:r>
+              <a:rPr lang="it-IT" sz="2400" dirty="0" err="1" smtClean="0"/>
+              <a:t>useless</a:t>
+            </a:r>
+            <a:r>
+              <a:rPr lang="it-IT" sz="2400" dirty="0" smtClean="0"/>
+              <a:t> to </a:t>
+            </a:r>
+            <a:r>
+              <a:rPr lang="it-IT" sz="2400" dirty="0" err="1" smtClean="0"/>
+              <a:t>activate</a:t>
+            </a:r>
+            <a:r>
+              <a:rPr lang="it-IT" sz="2400" dirty="0" smtClean="0"/>
+              <a:t> a </a:t>
+            </a:r>
+            <a:r>
+              <a:rPr lang="it-IT" sz="2400" dirty="0" err="1" smtClean="0"/>
+              <a:t>system</a:t>
+            </a:r>
+            <a:r>
+              <a:rPr lang="it-IT" sz="2400" dirty="0" smtClean="0"/>
+              <a:t> of fans in </a:t>
+            </a:r>
+            <a:r>
+              <a:rPr lang="it-IT" sz="2400" dirty="0" err="1" smtClean="0"/>
+              <a:t>order</a:t>
+            </a:r>
+            <a:r>
+              <a:rPr lang="it-IT" sz="2400" dirty="0" smtClean="0"/>
+              <a:t> to </a:t>
+            </a:r>
+            <a:r>
+              <a:rPr lang="it-IT" sz="2400" dirty="0" err="1" smtClean="0"/>
+              <a:t>recyle</a:t>
+            </a:r>
+            <a:r>
+              <a:rPr lang="it-IT" sz="2400" dirty="0" smtClean="0"/>
+              <a:t> the air, so </a:t>
+            </a:r>
+            <a:r>
+              <a:rPr lang="it-IT" sz="2400" dirty="0" err="1" smtClean="0"/>
+              <a:t>FtB</a:t>
+            </a:r>
+            <a:r>
+              <a:rPr lang="it-IT" sz="2400" dirty="0" smtClean="0"/>
+              <a:t> </a:t>
+            </a:r>
+            <a:r>
+              <a:rPr lang="it-IT" sz="2400" dirty="0" err="1" smtClean="0"/>
+              <a:t>won’t</a:t>
+            </a:r>
+            <a:r>
+              <a:rPr lang="it-IT" sz="2400" dirty="0" smtClean="0"/>
+              <a:t> do </a:t>
+            </a:r>
+            <a:r>
+              <a:rPr lang="it-IT" sz="2400" dirty="0" err="1" smtClean="0"/>
+              <a:t>it</a:t>
+            </a:r>
+            <a:r>
+              <a:rPr lang="it-IT" sz="2400" dirty="0" smtClean="0"/>
+              <a:t>, on the </a:t>
+            </a:r>
+            <a:r>
+              <a:rPr lang="it-IT" sz="2400" dirty="0" err="1" smtClean="0"/>
+              <a:t>contary</a:t>
+            </a:r>
+            <a:r>
+              <a:rPr lang="it-IT" sz="2400" dirty="0" smtClean="0"/>
+              <a:t> </a:t>
+            </a:r>
+            <a:r>
+              <a:rPr lang="it-IT" sz="2400" dirty="0" err="1" smtClean="0"/>
+              <a:t>it</a:t>
+            </a:r>
+            <a:r>
+              <a:rPr lang="it-IT" sz="2400" dirty="0" smtClean="0"/>
+              <a:t> </a:t>
+            </a:r>
+            <a:r>
+              <a:rPr lang="it-IT" sz="2400" dirty="0" err="1" smtClean="0"/>
+              <a:t>will</a:t>
+            </a:r>
+            <a:r>
+              <a:rPr lang="it-IT" sz="2400" dirty="0" smtClean="0"/>
+              <a:t> </a:t>
+            </a:r>
+            <a:r>
+              <a:rPr lang="it-IT" sz="2400" dirty="0" err="1" smtClean="0"/>
+              <a:t>inform</a:t>
+            </a:r>
+            <a:r>
+              <a:rPr lang="it-IT" sz="2400" dirty="0" smtClean="0"/>
+              <a:t> </a:t>
+            </a:r>
+            <a:r>
+              <a:rPr lang="it-IT" sz="2400" dirty="0" err="1" smtClean="0"/>
+              <a:t>you</a:t>
+            </a:r>
+            <a:r>
+              <a:rPr lang="it-IT" sz="2400" dirty="0" smtClean="0"/>
+              <a:t> </a:t>
+            </a:r>
+            <a:r>
+              <a:rPr lang="it-IT" sz="2400" dirty="0" err="1" smtClean="0"/>
+              <a:t>that</a:t>
+            </a:r>
+            <a:r>
+              <a:rPr lang="it-IT" sz="2400" dirty="0" smtClean="0"/>
+              <a:t> </a:t>
+            </a:r>
+            <a:r>
+              <a:rPr lang="it-IT" sz="2400" dirty="0" err="1" smtClean="0"/>
+              <a:t>you’d</a:t>
+            </a:r>
+            <a:r>
+              <a:rPr lang="it-IT" sz="2400" dirty="0" smtClean="0"/>
+              <a:t> </a:t>
+            </a:r>
+            <a:r>
+              <a:rPr lang="it-IT" sz="2400" dirty="0" err="1" smtClean="0"/>
+              <a:t>better</a:t>
+            </a:r>
+            <a:r>
+              <a:rPr lang="it-IT" sz="2400" dirty="0" smtClean="0"/>
+              <a:t> </a:t>
+            </a:r>
+            <a:r>
+              <a:rPr lang="it-IT" sz="2400" dirty="0" err="1" smtClean="0"/>
+              <a:t>close</a:t>
+            </a:r>
+            <a:r>
+              <a:rPr lang="it-IT" sz="2400" dirty="0" smtClean="0"/>
+              <a:t> </a:t>
+            </a:r>
+            <a:r>
+              <a:rPr lang="it-IT" sz="2400" dirty="0" err="1" smtClean="0"/>
+              <a:t>it!</a:t>
+            </a:r>
+            <a:endParaRPr lang="en-GB" sz="2400" dirty="0"/>
           </a:p>
         </p:txBody>
       </p:sp>

</xml_diff>

<commit_message>
v4 of the slides
It should be the final version of these slides, another version graphically better has been done bu Zulal, I will add it right now
</commit_message>
<xml_diff>
--- a/SLIDES.pptx
+++ b/SLIDES.pptx
@@ -9,10 +9,9 @@
     <p:sldId id="257" r:id="rId3"/>
     <p:sldId id="258" r:id="rId4"/>
     <p:sldId id="260" r:id="rId5"/>
-    <p:sldId id="262" r:id="rId6"/>
-    <p:sldId id="261" r:id="rId7"/>
-    <p:sldId id="263" r:id="rId8"/>
-    <p:sldId id="264" r:id="rId9"/>
+    <p:sldId id="261" r:id="rId6"/>
+    <p:sldId id="263" r:id="rId7"/>
+    <p:sldId id="264" r:id="rId8"/>
   </p:sldIdLst>
   <p:sldSz cx="12192000" cy="6858000"/>
   <p:notesSz cx="6858000" cy="9144000"/>
@@ -5198,139 +5197,6 @@
           <a:chExt cx="0" cy="0"/>
         </a:xfrm>
       </p:grpSpPr>
-      <p:pic>
-        <p:nvPicPr>
-          <p:cNvPr id="3" name="Immagine 2"/>
-          <p:cNvPicPr>
-            <a:picLocks noChangeAspect="1"/>
-          </p:cNvPicPr>
-          <p:nvPr/>
-        </p:nvPicPr>
-        <p:blipFill>
-          <a:blip r:embed="rId2">
-            <a:extLst>
-              <a:ext uri="{28A0092B-C50C-407E-A947-70E740481C1C}">
-                <a14:useLocalDpi xmlns:a14="http://schemas.microsoft.com/office/drawing/2010/main" val="0"/>
-              </a:ext>
-            </a:extLst>
-          </a:blip>
-          <a:stretch>
-            <a:fillRect/>
-          </a:stretch>
-        </p:blipFill>
-        <p:spPr>
-          <a:xfrm>
-            <a:off x="802640" y="441012"/>
-            <a:ext cx="10637520" cy="6119808"/>
-          </a:xfrm>
-          <a:prstGeom prst="rect">
-            <a:avLst/>
-          </a:prstGeom>
-        </p:spPr>
-      </p:pic>
-      <p:sp>
-        <p:nvSpPr>
-          <p:cNvPr id="4" name="CasellaDiTesto 3"/>
-          <p:cNvSpPr txBox="1"/>
-          <p:nvPr/>
-        </p:nvSpPr>
-        <p:spPr>
-          <a:xfrm>
-            <a:off x="7112000" y="1259840"/>
-            <a:ext cx="4165600" cy="369332"/>
-          </a:xfrm>
-          <a:prstGeom prst="rect">
-            <a:avLst/>
-          </a:prstGeom>
-          <a:noFill/>
-        </p:spPr>
-        <p:txBody>
-          <a:bodyPr wrap="square" rtlCol="0">
-            <a:spAutoFit/>
-          </a:bodyPr>
-          <a:lstStyle/>
-          <a:p>
-            <a:r>
-              <a:rPr lang="it-IT" dirty="0" smtClean="0"/>
-              <a:t>More in the </a:t>
-            </a:r>
-            <a:r>
-              <a:rPr lang="it-IT" dirty="0" err="1" smtClean="0"/>
-              <a:t>datail</a:t>
-            </a:r>
-            <a:r>
-              <a:rPr lang="it-IT" dirty="0" smtClean="0"/>
-              <a:t>…</a:t>
-            </a:r>
-            <a:endParaRPr lang="en-GB" dirty="0"/>
-          </a:p>
-        </p:txBody>
-      </p:sp>
-    </p:spTree>
-    <p:extLst>
-      <p:ext uri="{BB962C8B-B14F-4D97-AF65-F5344CB8AC3E}">
-        <p14:creationId xmlns:p14="http://schemas.microsoft.com/office/powerpoint/2010/main" val="2217109138"/>
-      </p:ext>
-    </p:extLst>
-  </p:cSld>
-  <p:clrMapOvr>
-    <a:masterClrMapping/>
-  </p:clrMapOvr>
-  <p:timing>
-    <p:tnLst>
-      <p:par>
-        <p:cTn id="1" dur="indefinite" restart="never" nodeType="tmRoot"/>
-      </p:par>
-    </p:tnLst>
-  </p:timing>
-</p:sld>
-</file>
-
-<file path=ppt/slides/slide6.xml><?xml version="1.0" encoding="utf-8"?>
-<p:sld xmlns:a="http://schemas.openxmlformats.org/drawingml/2006/main" xmlns:r="http://schemas.openxmlformats.org/officeDocument/2006/relationships" xmlns:p="http://schemas.openxmlformats.org/presentationml/2006/main">
-  <p:cSld>
-    <p:bg>
-      <p:bgPr>
-        <a:gradFill>
-          <a:gsLst>
-            <a:gs pos="0">
-              <a:schemeClr val="bg1"/>
-            </a:gs>
-            <a:gs pos="74000">
-              <a:schemeClr val="accent1">
-                <a:lumMod val="40000"/>
-                <a:lumOff val="60000"/>
-              </a:schemeClr>
-            </a:gs>
-            <a:gs pos="83000">
-              <a:schemeClr val="accent1">
-                <a:lumMod val="60000"/>
-                <a:lumOff val="40000"/>
-              </a:schemeClr>
-            </a:gs>
-            <a:gs pos="100000">
-              <a:schemeClr val="bg1"/>
-            </a:gs>
-          </a:gsLst>
-          <a:lin ang="5400000" scaled="1"/>
-        </a:gradFill>
-        <a:effectLst/>
-      </p:bgPr>
-    </p:bg>
-    <p:spTree>
-      <p:nvGrpSpPr>
-        <p:cNvPr id="1" name=""/>
-        <p:cNvGrpSpPr/>
-        <p:nvPr/>
-      </p:nvGrpSpPr>
-      <p:grpSpPr>
-        <a:xfrm>
-          <a:off x="0" y="0"/>
-          <a:ext cx="0" cy="0"/>
-          <a:chOff x="0" y="0"/>
-          <a:chExt cx="0" cy="0"/>
-        </a:xfrm>
-      </p:grpSpPr>
       <p:sp>
         <p:nvSpPr>
           <p:cNvPr id="4" name="Titolo 3"/>
@@ -6017,7 +5883,7 @@
         </p:nvSpPr>
         <p:spPr>
           <a:xfrm>
-            <a:off x="544945" y="6485601"/>
+            <a:off x="544945" y="6438378"/>
             <a:ext cx="6114904" cy="276999"/>
           </a:xfrm>
           <a:prstGeom prst="rect">
@@ -6175,7 +6041,7 @@
 </p:sld>
 </file>
 
-<file path=ppt/slides/slide7.xml><?xml version="1.0" encoding="utf-8"?>
+<file path=ppt/slides/slide6.xml><?xml version="1.0" encoding="utf-8"?>
 <p:sld xmlns:a="http://schemas.openxmlformats.org/drawingml/2006/main" xmlns:r="http://schemas.openxmlformats.org/officeDocument/2006/relationships" xmlns:p="http://schemas.openxmlformats.org/presentationml/2006/main">
   <p:cSld>
     <p:bg>
@@ -6479,7 +6345,7 @@
 </p:sld>
 </file>
 
-<file path=ppt/slides/slide8.xml><?xml version="1.0" encoding="utf-8"?>
+<file path=ppt/slides/slide7.xml><?xml version="1.0" encoding="utf-8"?>
 <p:sld xmlns:a="http://schemas.openxmlformats.org/drawingml/2006/main" xmlns:r="http://schemas.openxmlformats.org/officeDocument/2006/relationships" xmlns:p="http://schemas.openxmlformats.org/presentationml/2006/main">
   <p:cSld>
     <p:bg>

</xml_diff>